<commit_message>
Update 基于K8s开发.NET Core 云原生应用.pptx
</commit_message>
<xml_diff>
--- a/基于K8s开发.NET Core 云原生应用.pptx
+++ b/基于K8s开发.NET Core 云原生应用.pptx
@@ -33,11 +33,11 @@
     <p:sldId id="1588" r:id="rId24"/>
     <p:sldId id="283" r:id="rId25"/>
     <p:sldId id="1619" r:id="rId26"/>
-    <p:sldId id="1590" r:id="rId27"/>
-    <p:sldId id="1591" r:id="rId28"/>
-    <p:sldId id="1592" r:id="rId29"/>
-    <p:sldId id="1616" r:id="rId30"/>
-    <p:sldId id="1593" r:id="rId31"/>
+    <p:sldId id="1620" r:id="rId27"/>
+    <p:sldId id="1590" r:id="rId28"/>
+    <p:sldId id="1591" r:id="rId29"/>
+    <p:sldId id="1592" r:id="rId30"/>
+    <p:sldId id="1616" r:id="rId31"/>
     <p:sldId id="1594" r:id="rId32"/>
     <p:sldId id="261" r:id="rId33"/>
   </p:sldIdLst>
@@ -542,26 +542,7 @@
           <a:bodyPr/>
           <a:lstStyle/>
           <a:p>
-            <a:r>
-              <a:rPr lang="zh-CN" altLang="en-US" dirty="0"/>
-              <a:t>为了从</a:t>
-            </a:r>
-            <a:r>
-              <a:rPr lang="en-US" altLang="zh-CN" dirty="0"/>
-              <a:t>Kubernetes</a:t>
-            </a:r>
-            <a:r>
-              <a:rPr lang="zh-CN" altLang="en-US" dirty="0"/>
-              <a:t>开始，群集管理员和群集用户必须学习大量新内容才能使用这些新工具高效工作。在您可以自信地部署之前，</a:t>
-            </a:r>
-            <a:r>
-              <a:rPr lang="en-US" altLang="zh-CN" dirty="0"/>
-              <a:t>Docker</a:t>
-            </a:r>
-            <a:r>
-              <a:rPr lang="zh-CN" altLang="en-US" dirty="0"/>
-              <a:t>只是您需要了解的冰山之巅。</a:t>
-            </a:r>
+            <a:endParaRPr lang="zh-CN" altLang="en-US" dirty="0"/>
           </a:p>
         </p:txBody>
       </p:sp>
@@ -580,9 +561,9 @@
           <a:bodyPr/>
           <a:lstStyle/>
           <a:p>
-            <a:fld id="{A9DCBDDF-04FD-4D86-9705-56F18AA3D45B}" type="slidenum">
+            <a:fld id="{E9E6FDB6-6D2B-46C1-9FA1-D82906A37C3A}" type="slidenum">
               <a:rPr lang="zh-CN" altLang="en-US" smtClean="0"/>
-              <a:t>11</a:t>
+              <a:t>2</a:t>
             </a:fld>
             <a:endParaRPr lang="zh-CN" altLang="en-US"/>
           </a:p>
@@ -591,7 +572,7 @@
     </p:spTree>
     <p:extLst>
       <p:ext uri="{BB962C8B-B14F-4D97-AF65-F5344CB8AC3E}">
-        <p14:creationId xmlns:p14="http://schemas.microsoft.com/office/powerpoint/2010/main" val="2306108528"/>
+        <p14:creationId xmlns:p14="http://schemas.microsoft.com/office/powerpoint/2010/main" val="3004966591"/>
       </p:ext>
     </p:extLst>
   </p:cSld>
@@ -602,6 +583,31 @@
 </file>
 
 <file path=ppt/notesSlides/notesSlide10.xml><?xml version="1.0" encoding="utf-8"?>
+<p:notes xmlns:a="http://schemas.openxmlformats.org/drawingml/2006/main" xmlns:r="http://schemas.openxmlformats.org/officeDocument/2006/relationships" xmlns:p="http://schemas.openxmlformats.org/presentationml/2006/main">
+  <p:cSld>
+    <p:spTree>
+      <p:nvGrpSpPr>
+        <p:cNvPr id="1" name=""/>
+        <p:cNvGrpSpPr/>
+        <p:nvPr/>
+      </p:nvGrpSpPr>
+      <p:grpSpPr>
+        <a:xfrm>
+          <a:off x="0" y="0"/>
+          <a:ext cx="0" cy="0"/>
+          <a:chOff x="0" y="0"/>
+          <a:chExt cx="0" cy="0"/>
+        </a:xfrm>
+      </p:grpSpPr>
+    </p:spTree>
+  </p:cSld>
+  <p:clrMapOvr>
+    <a:masterClrMapping/>
+  </p:clrMapOvr>
+</p:notes>
+</file>
+
+<file path=ppt/notesSlides/notesSlide11.xml><?xml version="1.0" encoding="utf-8"?>
 <p:notes xmlns:a="http://schemas.openxmlformats.org/drawingml/2006/main" xmlns:r="http://schemas.openxmlformats.org/officeDocument/2006/relationships" xmlns:p="http://schemas.openxmlformats.org/presentationml/2006/main">
   <p:cSld>
     <p:spTree>
@@ -685,31 +691,6 @@
 </p:notes>
 </file>
 
-<file path=ppt/notesSlides/notesSlide11.xml><?xml version="1.0" encoding="utf-8"?>
-<p:notes xmlns:a="http://schemas.openxmlformats.org/drawingml/2006/main" xmlns:r="http://schemas.openxmlformats.org/officeDocument/2006/relationships" xmlns:p="http://schemas.openxmlformats.org/presentationml/2006/main">
-  <p:cSld>
-    <p:spTree>
-      <p:nvGrpSpPr>
-        <p:cNvPr id="1" name=""/>
-        <p:cNvGrpSpPr/>
-        <p:nvPr/>
-      </p:nvGrpSpPr>
-      <p:grpSpPr>
-        <a:xfrm>
-          <a:off x="0" y="0"/>
-          <a:ext cx="0" cy="0"/>
-          <a:chOff x="0" y="0"/>
-          <a:chExt cx="0" cy="0"/>
-        </a:xfrm>
-      </p:grpSpPr>
-    </p:spTree>
-  </p:cSld>
-  <p:clrMapOvr>
-    <a:masterClrMapping/>
-  </p:clrMapOvr>
-</p:notes>
-</file>
-
 <file path=ppt/notesSlides/notesSlide12.xml><?xml version="1.0" encoding="utf-8"?>
 <p:notes xmlns:a="http://schemas.openxmlformats.org/drawingml/2006/main" xmlns:r="http://schemas.openxmlformats.org/officeDocument/2006/relationships" xmlns:p="http://schemas.openxmlformats.org/presentationml/2006/main">
   <p:cSld>
@@ -728,6 +709,11 @@
         </a:xfrm>
       </p:grpSpPr>
     </p:spTree>
+    <p:extLst>
+      <p:ext uri="{BB962C8B-B14F-4D97-AF65-F5344CB8AC3E}">
+        <p14:creationId xmlns:p14="http://schemas.microsoft.com/office/powerpoint/2010/main" val="714515316"/>
+      </p:ext>
+    </p:extLst>
   </p:cSld>
   <p:clrMapOvr>
     <a:masterClrMapping/>
@@ -802,6 +788,89 @@
           <a:chExt cx="0" cy="0"/>
         </a:xfrm>
       </p:grpSpPr>
+      <p:sp>
+        <p:nvSpPr>
+          <p:cNvPr id="2" name="备注占位符 1">
+            <a:extLst>
+              <a:ext uri="{FF2B5EF4-FFF2-40B4-BE49-F238E27FC236}">
+                <a16:creationId xmlns:a16="http://schemas.microsoft.com/office/drawing/2014/main" id="{712E20DE-C2BE-4100-88F7-F24E605DC2C4}"/>
+              </a:ext>
+            </a:extLst>
+          </p:cNvPr>
+          <p:cNvSpPr>
+            <a:spLocks noGrp="1"/>
+          </p:cNvSpPr>
+          <p:nvPr>
+            <p:ph type="body" idx="1"/>
+          </p:nvPr>
+        </p:nvSpPr>
+        <p:spPr/>
+        <p:txBody>
+          <a:bodyPr/>
+          <a:lstStyle/>
+          <a:p>
+            <a:r>
+              <a:rPr lang="en-US" altLang="zh-CN" dirty="0"/>
+              <a:t>https://devblogs.microsoft.com/dotnet/net-core-container-images-now-published-to-microsoft-container-registry/</a:t>
+            </a:r>
+            <a:endParaRPr lang="zh-CN" altLang="en-US" dirty="0"/>
+          </a:p>
+        </p:txBody>
+      </p:sp>
+    </p:spTree>
+  </p:cSld>
+  <p:clrMapOvr>
+    <a:masterClrMapping/>
+  </p:clrMapOvr>
+</p:notes>
+</file>
+
+<file path=ppt/notesSlides/notesSlide16.xml><?xml version="1.0" encoding="utf-8"?>
+<p:notes xmlns:a="http://schemas.openxmlformats.org/drawingml/2006/main" xmlns:r="http://schemas.openxmlformats.org/officeDocument/2006/relationships" xmlns:p="http://schemas.openxmlformats.org/presentationml/2006/main">
+  <p:cSld>
+    <p:spTree>
+      <p:nvGrpSpPr>
+        <p:cNvPr id="1" name=""/>
+        <p:cNvGrpSpPr/>
+        <p:nvPr/>
+      </p:nvGrpSpPr>
+      <p:grpSpPr>
+        <a:xfrm>
+          <a:off x="0" y="0"/>
+          <a:ext cx="0" cy="0"/>
+          <a:chOff x="0" y="0"/>
+          <a:chExt cx="0" cy="0"/>
+        </a:xfrm>
+      </p:grpSpPr>
+      <p:sp>
+        <p:nvSpPr>
+          <p:cNvPr id="2" name="备注占位符 1">
+            <a:extLst>
+              <a:ext uri="{FF2B5EF4-FFF2-40B4-BE49-F238E27FC236}">
+                <a16:creationId xmlns:a16="http://schemas.microsoft.com/office/drawing/2014/main" id="{DC10E3CE-D774-414D-987D-98F884E28DA7}"/>
+              </a:ext>
+            </a:extLst>
+          </p:cNvPr>
+          <p:cNvSpPr>
+            <a:spLocks noGrp="1"/>
+          </p:cNvSpPr>
+          <p:nvPr>
+            <p:ph type="body" idx="1"/>
+          </p:nvPr>
+        </p:nvSpPr>
+        <p:spPr/>
+        <p:txBody>
+          <a:bodyPr/>
+          <a:lstStyle/>
+          <a:p>
+            <a:r>
+              <a:rPr lang="en-US" altLang="zh-CN" dirty="0"/>
+              <a:t>https://www.cnblogs.com/codelove/p/10244163.html</a:t>
+            </a:r>
+            <a:endParaRPr lang="zh-CN" altLang="en-US" dirty="0"/>
+          </a:p>
+        </p:txBody>
+      </p:sp>
     </p:spTree>
   </p:cSld>
   <p:clrMapOvr>
@@ -854,7 +923,26 @@
           <a:bodyPr/>
           <a:lstStyle/>
           <a:p>
-            <a:endParaRPr lang="en-US" altLang="zh-CN" dirty="0"/>
+            <a:r>
+              <a:rPr lang="zh-CN" altLang="en-US" dirty="0"/>
+              <a:t>为了从</a:t>
+            </a:r>
+            <a:r>
+              <a:rPr lang="en-US" altLang="zh-CN" dirty="0"/>
+              <a:t>Kubernetes</a:t>
+            </a:r>
+            <a:r>
+              <a:rPr lang="zh-CN" altLang="en-US" dirty="0"/>
+              <a:t>开始，群集管理员和群集用户必须学习大量新内容才能使用这些新工具高效工作。在您可以自信地部署之前，</a:t>
+            </a:r>
+            <a:r>
+              <a:rPr lang="en-US" altLang="zh-CN" dirty="0"/>
+              <a:t>Docker</a:t>
+            </a:r>
+            <a:r>
+              <a:rPr lang="zh-CN" altLang="en-US" dirty="0"/>
+              <a:t>只是您需要了解的冰山之巅。</a:t>
+            </a:r>
           </a:p>
         </p:txBody>
       </p:sp>
@@ -865,7 +953,7 @@
             <a:spLocks noGrp="1"/>
           </p:cNvSpPr>
           <p:nvPr>
-            <p:ph type="sldNum" sz="quarter" idx="10"/>
+            <p:ph type="sldNum" sz="quarter" idx="5"/>
           </p:nvPr>
         </p:nvSpPr>
         <p:spPr/>
@@ -873,9 +961,9 @@
           <a:bodyPr/>
           <a:lstStyle/>
           <a:p>
-            <a:fld id="{E9E6FDB6-6D2B-46C1-9FA1-D82906A37C3A}" type="slidenum">
+            <a:fld id="{A9DCBDDF-04FD-4D86-9705-56F18AA3D45B}" type="slidenum">
               <a:rPr lang="zh-CN" altLang="en-US" smtClean="0"/>
-              <a:t>14</a:t>
+              <a:t>11</a:t>
             </a:fld>
             <a:endParaRPr lang="zh-CN" altLang="en-US"/>
           </a:p>
@@ -884,7 +972,7 @@
     </p:spTree>
     <p:extLst>
       <p:ext uri="{BB962C8B-B14F-4D97-AF65-F5344CB8AC3E}">
-        <p14:creationId xmlns:p14="http://schemas.microsoft.com/office/powerpoint/2010/main" val="1424032888"/>
+        <p14:creationId xmlns:p14="http://schemas.microsoft.com/office/powerpoint/2010/main" val="2306108528"/>
       </p:ext>
     </p:extLst>
   </p:cSld>
@@ -911,7 +999,66 @@
           <a:chExt cx="0" cy="0"/>
         </a:xfrm>
       </p:grpSpPr>
+      <p:sp>
+        <p:nvSpPr>
+          <p:cNvPr id="2" name="幻灯片图像占位符 1"/>
+          <p:cNvSpPr>
+            <a:spLocks noGrp="1" noRot="1" noChangeAspect="1"/>
+          </p:cNvSpPr>
+          <p:nvPr>
+            <p:ph type="sldImg"/>
+          </p:nvPr>
+        </p:nvSpPr>
+        <p:spPr/>
+      </p:sp>
+      <p:sp>
+        <p:nvSpPr>
+          <p:cNvPr id="3" name="备注占位符 2"/>
+          <p:cNvSpPr>
+            <a:spLocks noGrp="1"/>
+          </p:cNvSpPr>
+          <p:nvPr>
+            <p:ph type="body" idx="1"/>
+          </p:nvPr>
+        </p:nvSpPr>
+        <p:spPr/>
+        <p:txBody>
+          <a:bodyPr/>
+          <a:lstStyle/>
+          <a:p>
+            <a:endParaRPr lang="en-US" altLang="zh-CN" dirty="0"/>
+          </a:p>
+        </p:txBody>
+      </p:sp>
+      <p:sp>
+        <p:nvSpPr>
+          <p:cNvPr id="4" name="灯片编号占位符 3"/>
+          <p:cNvSpPr>
+            <a:spLocks noGrp="1"/>
+          </p:cNvSpPr>
+          <p:nvPr>
+            <p:ph type="sldNum" sz="quarter" idx="10"/>
+          </p:nvPr>
+        </p:nvSpPr>
+        <p:spPr/>
+        <p:txBody>
+          <a:bodyPr/>
+          <a:lstStyle/>
+          <a:p>
+            <a:fld id="{E9E6FDB6-6D2B-46C1-9FA1-D82906A37C3A}" type="slidenum">
+              <a:rPr lang="zh-CN" altLang="en-US" smtClean="0"/>
+              <a:t>14</a:t>
+            </a:fld>
+            <a:endParaRPr lang="zh-CN" altLang="en-US"/>
+          </a:p>
+        </p:txBody>
+      </p:sp>
     </p:spTree>
+    <p:extLst>
+      <p:ext uri="{BB962C8B-B14F-4D97-AF65-F5344CB8AC3E}">
+        <p14:creationId xmlns:p14="http://schemas.microsoft.com/office/powerpoint/2010/main" val="1424032888"/>
+      </p:ext>
+    </p:extLst>
   </p:cSld>
   <p:clrMapOvr>
     <a:masterClrMapping/>
@@ -5617,7 +5764,7 @@
           <a:graphicData uri="http://schemas.openxmlformats.org/presentationml/2006/ole">
             <mc:AlternateContent xmlns:mc="http://schemas.openxmlformats.org/markup-compatibility/2006">
               <mc:Choice xmlns:v="urn:schemas-microsoft-com:vml" Requires="v">
-                <p:oleObj spid="_x0000_s1097" name="think-cell Slide" r:id="rId6" imgW="347" imgH="348" progId="TCLayout.ActiveDocument.1">
+                <p:oleObj spid="_x0000_s1100" name="think-cell Slide" r:id="rId6" imgW="347" imgH="348" progId="TCLayout.ActiveDocument.1">
                   <p:embed/>
                 </p:oleObj>
               </mc:Choice>
@@ -15054,7 +15201,7 @@
           <p:nvPr/>
         </p:nvPicPr>
         <p:blipFill>
-          <a:blip r:embed="rId2"/>
+          <a:blip r:embed="rId3"/>
           <a:stretch>
             <a:fillRect/>
           </a:stretch>
@@ -15326,7 +15473,7 @@
           <p:nvPr/>
         </p:nvPicPr>
         <p:blipFill>
-          <a:blip r:embed="rId3"/>
+          <a:blip r:embed="rId4"/>
           <a:stretch>
             <a:fillRect/>
           </a:stretch>
@@ -20878,6 +21025,169 @@
                   <a:schemeClr val="tx1"/>
                 </a:solidFill>
               </a:rPr>
+              <a:t>基于</a:t>
+            </a:r>
+            <a:r>
+              <a:rPr lang="en-US" altLang="zh-CN" dirty="0">
+                <a:solidFill>
+                  <a:schemeClr val="tx1"/>
+                </a:solidFill>
+              </a:rPr>
+              <a:t>Kubernetes </a:t>
+            </a:r>
+            <a:r>
+              <a:rPr lang="zh-CN" altLang="en-US" dirty="0">
+                <a:solidFill>
+                  <a:schemeClr val="tx1"/>
+                </a:solidFill>
+              </a:rPr>
+              <a:t>构建</a:t>
+            </a:r>
+            <a:r>
+              <a:rPr lang="en-US" altLang="zh-CN" dirty="0">
+                <a:solidFill>
+                  <a:schemeClr val="tx1"/>
+                </a:solidFill>
+              </a:rPr>
+              <a:t>.NET Core</a:t>
+            </a:r>
+            <a:r>
+              <a:rPr lang="zh-CN" altLang="en-US" dirty="0">
+                <a:solidFill>
+                  <a:schemeClr val="tx1"/>
+                </a:solidFill>
+              </a:rPr>
+              <a:t>应用</a:t>
+            </a:r>
+            <a:endParaRPr lang="en-GB" dirty="0">
+              <a:solidFill>
+                <a:schemeClr val="tx1"/>
+              </a:solidFill>
+            </a:endParaRPr>
+          </a:p>
+        </p:txBody>
+      </p:sp>
+      <p:pic>
+        <p:nvPicPr>
+          <p:cNvPr id="3074" name="Picture 2" descr="åºäºkubernetesçå¼åè¿è¥å¹³å°">
+            <a:extLst>
+              <a:ext uri="{FF2B5EF4-FFF2-40B4-BE49-F238E27FC236}">
+                <a16:creationId xmlns:a16="http://schemas.microsoft.com/office/drawing/2014/main" id="{15CD77CD-2FE0-46FB-8A4A-92A82134B3AB}"/>
+              </a:ext>
+            </a:extLst>
+          </p:cNvPr>
+          <p:cNvPicPr>
+            <a:picLocks noChangeAspect="1" noChangeArrowheads="1"/>
+          </p:cNvPicPr>
+          <p:nvPr/>
+        </p:nvPicPr>
+        <p:blipFill>
+          <a:blip r:embed="rId3">
+            <a:extLst>
+              <a:ext uri="{28A0092B-C50C-407E-A947-70E740481C1C}">
+                <a14:useLocalDpi xmlns:a14="http://schemas.microsoft.com/office/drawing/2010/main" val="0"/>
+              </a:ext>
+            </a:extLst>
+          </a:blip>
+          <a:srcRect/>
+          <a:stretch>
+            <a:fillRect/>
+          </a:stretch>
+        </p:blipFill>
+        <p:spPr bwMode="auto">
+          <a:xfrm>
+            <a:off x="2590600" y="1028700"/>
+            <a:ext cx="5726113" cy="5659483"/>
+          </a:xfrm>
+          <a:prstGeom prst="rect">
+            <a:avLst/>
+          </a:prstGeom>
+          <a:noFill/>
+          <a:extLst>
+            <a:ext uri="{909E8E84-426E-40DD-AFC4-6F175D3DCCD1}">
+              <a14:hiddenFill xmlns:a14="http://schemas.microsoft.com/office/drawing/2010/main">
+                <a:solidFill>
+                  <a:srgbClr val="FFFFFF"/>
+                </a:solidFill>
+              </a14:hiddenFill>
+            </a:ext>
+          </a:extLst>
+        </p:spPr>
+      </p:pic>
+    </p:spTree>
+    <p:extLst>
+      <p:ext uri="{BB962C8B-B14F-4D97-AF65-F5344CB8AC3E}">
+        <p14:creationId xmlns:p14="http://schemas.microsoft.com/office/powerpoint/2010/main" val="556785824"/>
+      </p:ext>
+    </p:extLst>
+  </p:cSld>
+  <p:clrMapOvr>
+    <a:masterClrMapping/>
+  </p:clrMapOvr>
+  <mc:AlternateContent xmlns:mc="http://schemas.openxmlformats.org/markup-compatibility/2006" xmlns:p14="http://schemas.microsoft.com/office/powerpoint/2010/main">
+    <mc:Choice Requires="p14">
+      <p:transition spd="med" p14:dur="700">
+        <p:fade/>
+      </p:transition>
+    </mc:Choice>
+    <mc:Fallback xmlns="">
+      <p:transition spd="med">
+        <p:fade/>
+      </p:transition>
+    </mc:Fallback>
+  </mc:AlternateContent>
+</p:sld>
+</file>
+
+<file path=ppt/slides/slide27.xml><?xml version="1.0" encoding="utf-8"?>
+<p:sld xmlns:a="http://schemas.openxmlformats.org/drawingml/2006/main" xmlns:r="http://schemas.openxmlformats.org/officeDocument/2006/relationships" xmlns:p="http://schemas.openxmlformats.org/presentationml/2006/main">
+  <p:cSld>
+    <p:spTree>
+      <p:nvGrpSpPr>
+        <p:cNvPr id="1" name=""/>
+        <p:cNvGrpSpPr/>
+        <p:nvPr/>
+      </p:nvGrpSpPr>
+      <p:grpSpPr>
+        <a:xfrm>
+          <a:off x="0" y="0"/>
+          <a:ext cx="0" cy="0"/>
+          <a:chOff x="0" y="0"/>
+          <a:chExt cx="0" cy="0"/>
+        </a:xfrm>
+      </p:grpSpPr>
+      <p:sp>
+        <p:nvSpPr>
+          <p:cNvPr id="2" name="Title 1">
+            <a:extLst>
+              <a:ext uri="{FF2B5EF4-FFF2-40B4-BE49-F238E27FC236}">
+                <a16:creationId xmlns:a16="http://schemas.microsoft.com/office/drawing/2014/main" id="{C118C554-925A-4676-9481-7505FE41C531}"/>
+              </a:ext>
+            </a:extLst>
+          </p:cNvPr>
+          <p:cNvSpPr>
+            <a:spLocks noGrp="1"/>
+          </p:cNvSpPr>
+          <p:nvPr>
+            <p:ph type="title"/>
+          </p:nvPr>
+        </p:nvSpPr>
+        <p:spPr>
+          <a:xfrm>
+            <a:off x="805342" y="330325"/>
+            <a:ext cx="10726993" cy="651187"/>
+          </a:xfrm>
+        </p:spPr>
+        <p:txBody>
+          <a:bodyPr/>
+          <a:lstStyle/>
+          <a:p>
+            <a:r>
+              <a:rPr lang="zh-CN" altLang="en-US" dirty="0">
+                <a:solidFill>
+                  <a:schemeClr val="tx1"/>
+                </a:solidFill>
+              </a:rPr>
               <a:t>应用</a:t>
             </a:r>
             <a:endParaRPr lang="en-GB" dirty="0">
@@ -21109,7 +21419,7 @@
 </p:sld>
 </file>
 
-<file path=ppt/slides/slide27.xml><?xml version="1.0" encoding="utf-8"?>
+<file path=ppt/slides/slide28.xml><?xml version="1.0" encoding="utf-8"?>
 <p:sld xmlns:a="http://schemas.openxmlformats.org/drawingml/2006/main" xmlns:r="http://schemas.openxmlformats.org/officeDocument/2006/relationships" xmlns:p="http://schemas.openxmlformats.org/presentationml/2006/main">
   <p:cSld>
     <p:spTree>
@@ -21267,7 +21577,7 @@
 </p:sld>
 </file>
 
-<file path=ppt/slides/slide28.xml><?xml version="1.0" encoding="utf-8"?>
+<file path=ppt/slides/slide29.xml><?xml version="1.0" encoding="utf-8"?>
 <p:sld xmlns:a="http://schemas.openxmlformats.org/drawingml/2006/main" xmlns:r="http://schemas.openxmlformats.org/officeDocument/2006/relationships" xmlns:p="http://schemas.openxmlformats.org/presentationml/2006/main">
   <p:cSld>
     <p:spTree>
@@ -21326,6 +21636,191 @@
           </a:p>
         </p:txBody>
       </p:sp>
+      <p:pic>
+        <p:nvPicPr>
+          <p:cNvPr id="3" name="图片 2">
+            <a:extLst>
+              <a:ext uri="{FF2B5EF4-FFF2-40B4-BE49-F238E27FC236}">
+                <a16:creationId xmlns:a16="http://schemas.microsoft.com/office/drawing/2014/main" id="{3C22AF10-1BEB-4943-B7A8-6E2D58F5C526}"/>
+              </a:ext>
+            </a:extLst>
+          </p:cNvPr>
+          <p:cNvPicPr/>
+          <p:nvPr/>
+        </p:nvPicPr>
+        <p:blipFill>
+          <a:blip r:embed="rId3"/>
+          <a:stretch>
+            <a:fillRect/>
+          </a:stretch>
+        </p:blipFill>
+        <p:spPr>
+          <a:xfrm>
+            <a:off x="2117725" y="1438910"/>
+            <a:ext cx="5274310" cy="3937635"/>
+          </a:xfrm>
+          <a:prstGeom prst="rect">
+            <a:avLst/>
+          </a:prstGeom>
+        </p:spPr>
+      </p:pic>
+      <p:pic>
+        <p:nvPicPr>
+          <p:cNvPr id="4" name="图片 3">
+            <a:extLst>
+              <a:ext uri="{FF2B5EF4-FFF2-40B4-BE49-F238E27FC236}">
+                <a16:creationId xmlns:a16="http://schemas.microsoft.com/office/drawing/2014/main" id="{DBB3CFC3-F7A7-4FC3-B651-B4BB57229BF9}"/>
+              </a:ext>
+            </a:extLst>
+          </p:cNvPr>
+          <p:cNvPicPr/>
+          <p:nvPr/>
+        </p:nvPicPr>
+        <p:blipFill>
+          <a:blip r:embed="rId4"/>
+          <a:stretch>
+            <a:fillRect/>
+          </a:stretch>
+        </p:blipFill>
+        <p:spPr>
+          <a:xfrm>
+            <a:off x="3869690" y="1417637"/>
+            <a:ext cx="5274310" cy="3980180"/>
+          </a:xfrm>
+          <a:prstGeom prst="rect">
+            <a:avLst/>
+          </a:prstGeom>
+        </p:spPr>
+      </p:pic>
+      <p:sp>
+        <p:nvSpPr>
+          <p:cNvPr id="5" name="矩形 4">
+            <a:extLst>
+              <a:ext uri="{FF2B5EF4-FFF2-40B4-BE49-F238E27FC236}">
+                <a16:creationId xmlns:a16="http://schemas.microsoft.com/office/drawing/2014/main" id="{89B464E9-EB0C-4121-A965-DA43F6B12F20}"/>
+              </a:ext>
+            </a:extLst>
+          </p:cNvPr>
+          <p:cNvSpPr/>
+          <p:nvPr/>
+        </p:nvSpPr>
+        <p:spPr>
+          <a:xfrm>
+            <a:off x="2394328" y="5632031"/>
+            <a:ext cx="6958678" cy="369332"/>
+          </a:xfrm>
+          <a:prstGeom prst="rect">
+            <a:avLst/>
+          </a:prstGeom>
+        </p:spPr>
+        <p:txBody>
+          <a:bodyPr wrap="square">
+            <a:spAutoFit/>
+          </a:bodyPr>
+          <a:lstStyle/>
+          <a:p>
+            <a:r>
+              <a:rPr lang="en-US" altLang="zh-CN" dirty="0"/>
+              <a:t>docker login --username=geffzhang hub.tencentyun.com</a:t>
+            </a:r>
+            <a:endParaRPr lang="zh-CN" altLang="en-US" dirty="0"/>
+          </a:p>
+        </p:txBody>
+      </p:sp>
+      <p:sp>
+        <p:nvSpPr>
+          <p:cNvPr id="6" name="矩形 5">
+            <a:extLst>
+              <a:ext uri="{FF2B5EF4-FFF2-40B4-BE49-F238E27FC236}">
+                <a16:creationId xmlns:a16="http://schemas.microsoft.com/office/drawing/2014/main" id="{9DDD6037-4943-4BA2-8D06-F786C4DA8F8D}"/>
+              </a:ext>
+            </a:extLst>
+          </p:cNvPr>
+          <p:cNvSpPr/>
+          <p:nvPr/>
+        </p:nvSpPr>
+        <p:spPr>
+          <a:xfrm>
+            <a:off x="2394328" y="5917297"/>
+            <a:ext cx="8055958" cy="369332"/>
+          </a:xfrm>
+          <a:prstGeom prst="rect">
+            <a:avLst/>
+          </a:prstGeom>
+        </p:spPr>
+        <p:txBody>
+          <a:bodyPr wrap="square">
+            <a:spAutoFit/>
+          </a:bodyPr>
+          <a:lstStyle/>
+          <a:p>
+            <a:r>
+              <a:rPr lang="en-US" altLang="zh-CN" dirty="0"/>
+              <a:t>docker tag [</a:t>
+            </a:r>
+            <a:r>
+              <a:rPr lang="en-US" altLang="zh-CN" dirty="0" err="1"/>
+              <a:t>ImageId</a:t>
+            </a:r>
+            <a:r>
+              <a:rPr lang="en-US" altLang="zh-CN" dirty="0"/>
+              <a:t>] hub.tencentyun.com/geffzhang/</a:t>
+            </a:r>
+            <a:r>
+              <a:rPr lang="en-US" altLang="zh-CN" dirty="0" err="1"/>
+              <a:t>apigateway</a:t>
+            </a:r>
+            <a:r>
+              <a:rPr lang="en-US" altLang="zh-CN" dirty="0"/>
+              <a:t>:[tag]</a:t>
+            </a:r>
+            <a:endParaRPr lang="zh-CN" altLang="en-US" dirty="0"/>
+          </a:p>
+        </p:txBody>
+      </p:sp>
+      <p:sp>
+        <p:nvSpPr>
+          <p:cNvPr id="7" name="矩形 6">
+            <a:extLst>
+              <a:ext uri="{FF2B5EF4-FFF2-40B4-BE49-F238E27FC236}">
+                <a16:creationId xmlns:a16="http://schemas.microsoft.com/office/drawing/2014/main" id="{DBC2411E-FDEE-4C4B-90A2-E3E34F307ADE}"/>
+              </a:ext>
+            </a:extLst>
+          </p:cNvPr>
+          <p:cNvSpPr/>
+          <p:nvPr/>
+        </p:nvSpPr>
+        <p:spPr>
+          <a:xfrm>
+            <a:off x="2394328" y="6291755"/>
+            <a:ext cx="7812118" cy="369332"/>
+          </a:xfrm>
+          <a:prstGeom prst="rect">
+            <a:avLst/>
+          </a:prstGeom>
+        </p:spPr>
+        <p:txBody>
+          <a:bodyPr wrap="square">
+            <a:spAutoFit/>
+          </a:bodyPr>
+          <a:lstStyle/>
+          <a:p>
+            <a:r>
+              <a:rPr lang="en-US" altLang="zh-CN" dirty="0"/>
+              <a:t>docker push hub.tencentyun.com/geffzhang/</a:t>
+            </a:r>
+            <a:r>
+              <a:rPr lang="en-US" altLang="zh-CN" dirty="0" err="1"/>
+              <a:t>apigateway</a:t>
+            </a:r>
+            <a:r>
+              <a:rPr lang="en-US" altLang="zh-CN" dirty="0"/>
+              <a:t>:[tag]</a:t>
+            </a:r>
+            <a:endParaRPr lang="zh-CN" altLang="en-US" dirty="0"/>
+          </a:p>
+        </p:txBody>
+      </p:sp>
     </p:spTree>
     <p:extLst>
       <p:ext uri="{BB962C8B-B14F-4D97-AF65-F5344CB8AC3E}">
@@ -21348,164 +21843,180 @@
       </p:transition>
     </mc:Fallback>
   </mc:AlternateContent>
-</p:sld>
-</file>
-
-<file path=ppt/slides/slide29.xml><?xml version="1.0" encoding="utf-8"?>
-<p:sld xmlns:a="http://schemas.openxmlformats.org/drawingml/2006/main" xmlns:r="http://schemas.openxmlformats.org/officeDocument/2006/relationships" xmlns:p="http://schemas.openxmlformats.org/presentationml/2006/main">
-  <p:cSld>
-    <p:spTree>
-      <p:nvGrpSpPr>
-        <p:cNvPr id="1" name=""/>
-        <p:cNvGrpSpPr/>
-        <p:nvPr/>
-      </p:nvGrpSpPr>
-      <p:grpSpPr>
-        <a:xfrm>
-          <a:off x="0" y="0"/>
-          <a:ext cx="0" cy="0"/>
-          <a:chOff x="0" y="0"/>
-          <a:chExt cx="0" cy="0"/>
-        </a:xfrm>
-      </p:grpSpPr>
-      <p:sp>
-        <p:nvSpPr>
-          <p:cNvPr id="2" name="标题 1">
-            <a:extLst>
-              <a:ext uri="{FF2B5EF4-FFF2-40B4-BE49-F238E27FC236}">
-                <a16:creationId xmlns:a16="http://schemas.microsoft.com/office/drawing/2014/main" id="{39571B9A-C341-4D8B-8AD1-C3171DC106EB}"/>
-              </a:ext>
-            </a:extLst>
-          </p:cNvPr>
-          <p:cNvSpPr>
-            <a:spLocks noGrp="1"/>
-          </p:cNvSpPr>
-          <p:nvPr>
-            <p:ph type="title"/>
-          </p:nvPr>
-        </p:nvSpPr>
-        <p:spPr/>
-        <p:txBody>
-          <a:bodyPr/>
-          <a:lstStyle/>
-          <a:p>
-            <a:r>
-              <a:rPr lang="en-US" altLang="zh-CN" dirty="0">
-                <a:solidFill>
-                  <a:schemeClr val="tx1"/>
-                </a:solidFill>
-              </a:rPr>
-              <a:t>Visual Studio 2019 k8s </a:t>
-            </a:r>
-            <a:endParaRPr lang="zh-CN" altLang="en-US" dirty="0">
-              <a:solidFill>
-                <a:schemeClr val="tx1"/>
-              </a:solidFill>
-            </a:endParaRPr>
-          </a:p>
-        </p:txBody>
-      </p:sp>
-      <p:sp>
-        <p:nvSpPr>
-          <p:cNvPr id="3" name="内容占位符 2">
-            <a:extLst>
-              <a:ext uri="{FF2B5EF4-FFF2-40B4-BE49-F238E27FC236}">
-                <a16:creationId xmlns:a16="http://schemas.microsoft.com/office/drawing/2014/main" id="{49048738-C71B-413F-9CE4-58DCC2940F77}"/>
-              </a:ext>
-            </a:extLst>
-          </p:cNvPr>
-          <p:cNvSpPr>
-            <a:spLocks noGrp="1"/>
-          </p:cNvSpPr>
-          <p:nvPr>
-            <p:ph idx="1"/>
-          </p:nvPr>
-        </p:nvSpPr>
-        <p:spPr/>
-        <p:txBody>
-          <a:bodyPr/>
-          <a:lstStyle/>
-          <a:p>
-            <a:r>
-              <a:rPr lang="en-US" altLang="zh-CN" dirty="0"/>
-              <a:t> Visual Studio </a:t>
-            </a:r>
-            <a:r>
-              <a:rPr lang="zh-CN" altLang="en-US" dirty="0"/>
-              <a:t>中的容器工具</a:t>
-            </a:r>
-            <a:r>
-              <a:rPr lang="en-US" altLang="zh-CN" dirty="0"/>
-              <a:t>:</a:t>
-            </a:r>
-            <a:endParaRPr lang="zh-CN" altLang="en-US" dirty="0"/>
-          </a:p>
-          <a:p>
-            <a:pPr marL="0" indent="0">
-              <a:buNone/>
-            </a:pPr>
-            <a:r>
-              <a:rPr lang="en-US" altLang="zh-CN" dirty="0">
-                <a:hlinkClick r:id="rId2"/>
-              </a:rPr>
-              <a:t>https://docs.microsoft.com/zh-cn/visualstudio/containers/?view=vs-2019</a:t>
-            </a:r>
-            <a:endParaRPr lang="en-US" altLang="zh-CN" dirty="0"/>
-          </a:p>
-          <a:p>
-            <a:pPr marL="0" indent="0">
-              <a:buNone/>
-            </a:pPr>
-            <a:endParaRPr lang="en-US" altLang="zh-CN" dirty="0"/>
-          </a:p>
-          <a:p>
-            <a:pPr marL="0" indent="0">
-              <a:buNone/>
-            </a:pPr>
-            <a:endParaRPr lang="zh-CN" altLang="en-US" dirty="0"/>
-          </a:p>
-        </p:txBody>
-      </p:sp>
-      <p:sp>
-        <p:nvSpPr>
-          <p:cNvPr id="4" name="灯片编号占位符 3">
-            <a:extLst>
-              <a:ext uri="{FF2B5EF4-FFF2-40B4-BE49-F238E27FC236}">
-                <a16:creationId xmlns:a16="http://schemas.microsoft.com/office/drawing/2014/main" id="{DA9C59B0-F48D-452F-B36C-841FED6D33B2}"/>
-              </a:ext>
-            </a:extLst>
-          </p:cNvPr>
-          <p:cNvSpPr>
-            <a:spLocks noGrp="1"/>
-          </p:cNvSpPr>
-          <p:nvPr>
-            <p:ph type="sldNum" sz="quarter" idx="12"/>
-          </p:nvPr>
-        </p:nvSpPr>
-        <p:spPr/>
-        <p:txBody>
-          <a:bodyPr/>
-          <a:lstStyle/>
-          <a:p>
-            <a:fld id="{0A164282-434E-41D4-9582-783D542A7B68}" type="slidenum">
-              <a:rPr lang="en-US" smtClean="0"/>
-              <a:pPr/>
-              <a:t>29</a:t>
-            </a:fld>
-            <a:endParaRPr lang="en-US"/>
-          </a:p>
-        </p:txBody>
-      </p:sp>
-    </p:spTree>
-    <p:extLst>
-      <p:ext uri="{BB962C8B-B14F-4D97-AF65-F5344CB8AC3E}">
-        <p14:creationId xmlns:p14="http://schemas.microsoft.com/office/powerpoint/2010/main" val="1952295127"/>
-      </p:ext>
-    </p:extLst>
-  </p:cSld>
-  <p:clrMapOvr>
-    <a:masterClrMapping/>
-  </p:clrMapOvr>
+  <p:timing>
+    <p:tnLst>
+      <p:par>
+        <p:cTn id="1" dur="indefinite" restart="never" nodeType="tmRoot">
+          <p:childTnLst>
+            <p:seq concurrent="1" nextAc="seek">
+              <p:cTn id="2" dur="indefinite" nodeType="mainSeq">
+                <p:childTnLst>
+                  <p:par>
+                    <p:cTn id="3" fill="hold">
+                      <p:stCondLst>
+                        <p:cond delay="indefinite"/>
+                      </p:stCondLst>
+                      <p:childTnLst>
+                        <p:par>
+                          <p:cTn id="4" fill="hold">
+                            <p:stCondLst>
+                              <p:cond delay="0"/>
+                            </p:stCondLst>
+                            <p:childTnLst>
+                              <p:par>
+                                <p:cTn id="5" presetID="2" presetClass="entr" presetSubtype="4" fill="hold" nodeType="clickEffect">
+                                  <p:stCondLst>
+                                    <p:cond delay="0"/>
+                                  </p:stCondLst>
+                                  <p:childTnLst>
+                                    <p:set>
+                                      <p:cBhvr>
+                                        <p:cTn id="6" dur="1" fill="hold">
+                                          <p:stCondLst>
+                                            <p:cond delay="0"/>
+                                          </p:stCondLst>
+                                        </p:cTn>
+                                        <p:tgtEl>
+                                          <p:spTgt spid="3"/>
+                                        </p:tgtEl>
+                                        <p:attrNameLst>
+                                          <p:attrName>style.visibility</p:attrName>
+                                        </p:attrNameLst>
+                                      </p:cBhvr>
+                                      <p:to>
+                                        <p:strVal val="visible"/>
+                                      </p:to>
+                                    </p:set>
+                                    <p:anim calcmode="lin" valueType="num">
+                                      <p:cBhvr additive="base">
+                                        <p:cTn id="7" dur="500" fill="hold"/>
+                                        <p:tgtEl>
+                                          <p:spTgt spid="3"/>
+                                        </p:tgtEl>
+                                        <p:attrNameLst>
+                                          <p:attrName>ppt_x</p:attrName>
+                                        </p:attrNameLst>
+                                      </p:cBhvr>
+                                      <p:tavLst>
+                                        <p:tav tm="0">
+                                          <p:val>
+                                            <p:strVal val="#ppt_x"/>
+                                          </p:val>
+                                        </p:tav>
+                                        <p:tav tm="100000">
+                                          <p:val>
+                                            <p:strVal val="#ppt_x"/>
+                                          </p:val>
+                                        </p:tav>
+                                      </p:tavLst>
+                                    </p:anim>
+                                    <p:anim calcmode="lin" valueType="num">
+                                      <p:cBhvr additive="base">
+                                        <p:cTn id="8" dur="500" fill="hold"/>
+                                        <p:tgtEl>
+                                          <p:spTgt spid="3"/>
+                                        </p:tgtEl>
+                                        <p:attrNameLst>
+                                          <p:attrName>ppt_y</p:attrName>
+                                        </p:attrNameLst>
+                                      </p:cBhvr>
+                                      <p:tavLst>
+                                        <p:tav tm="0">
+                                          <p:val>
+                                            <p:strVal val="1+#ppt_h/2"/>
+                                          </p:val>
+                                        </p:tav>
+                                        <p:tav tm="100000">
+                                          <p:val>
+                                            <p:strVal val="#ppt_y"/>
+                                          </p:val>
+                                        </p:tav>
+                                      </p:tavLst>
+                                    </p:anim>
+                                  </p:childTnLst>
+                                </p:cTn>
+                              </p:par>
+                            </p:childTnLst>
+                          </p:cTn>
+                        </p:par>
+                      </p:childTnLst>
+                    </p:cTn>
+                  </p:par>
+                  <p:par>
+                    <p:cTn id="9" fill="hold">
+                      <p:stCondLst>
+                        <p:cond delay="indefinite"/>
+                      </p:stCondLst>
+                      <p:childTnLst>
+                        <p:par>
+                          <p:cTn id="10" fill="hold">
+                            <p:stCondLst>
+                              <p:cond delay="0"/>
+                            </p:stCondLst>
+                            <p:childTnLst>
+                              <p:par>
+                                <p:cTn id="11" presetID="10" presetClass="entr" presetSubtype="0" fill="hold" nodeType="clickEffect">
+                                  <p:stCondLst>
+                                    <p:cond delay="0"/>
+                                  </p:stCondLst>
+                                  <p:childTnLst>
+                                    <p:set>
+                                      <p:cBhvr>
+                                        <p:cTn id="12" dur="1" fill="hold">
+                                          <p:stCondLst>
+                                            <p:cond delay="0"/>
+                                          </p:stCondLst>
+                                        </p:cTn>
+                                        <p:tgtEl>
+                                          <p:spTgt spid="4"/>
+                                        </p:tgtEl>
+                                        <p:attrNameLst>
+                                          <p:attrName>style.visibility</p:attrName>
+                                        </p:attrNameLst>
+                                      </p:cBhvr>
+                                      <p:to>
+                                        <p:strVal val="visible"/>
+                                      </p:to>
+                                    </p:set>
+                                    <p:animEffect transition="in" filter="fade">
+                                      <p:cBhvr>
+                                        <p:cTn id="13" dur="500"/>
+                                        <p:tgtEl>
+                                          <p:spTgt spid="4"/>
+                                        </p:tgtEl>
+                                      </p:cBhvr>
+                                    </p:animEffect>
+                                  </p:childTnLst>
+                                </p:cTn>
+                              </p:par>
+                            </p:childTnLst>
+                          </p:cTn>
+                        </p:par>
+                      </p:childTnLst>
+                    </p:cTn>
+                  </p:par>
+                </p:childTnLst>
+              </p:cTn>
+              <p:prevCondLst>
+                <p:cond evt="onPrev" delay="0">
+                  <p:tgtEl>
+                    <p:sldTgt/>
+                  </p:tgtEl>
+                </p:cond>
+              </p:prevCondLst>
+              <p:nextCondLst>
+                <p:cond evt="onNext" delay="0">
+                  <p:tgtEl>
+                    <p:sldTgt/>
+                  </p:tgtEl>
+                </p:cond>
+              </p:nextCondLst>
+            </p:seq>
+          </p:childTnLst>
+        </p:cTn>
+      </p:par>
+    </p:tnLst>
+  </p:timing>
 </p:sld>
 </file>
 
@@ -22599,10 +23110,10 @@
       </p:grpSpPr>
       <p:sp>
         <p:nvSpPr>
-          <p:cNvPr id="2" name="Title 1">
+          <p:cNvPr id="2" name="标题 1">
             <a:extLst>
               <a:ext uri="{FF2B5EF4-FFF2-40B4-BE49-F238E27FC236}">
-                <a16:creationId xmlns:a16="http://schemas.microsoft.com/office/drawing/2014/main" id="{C118C554-925A-4676-9481-7505FE41C531}"/>
+                <a16:creationId xmlns:a16="http://schemas.microsoft.com/office/drawing/2014/main" id="{39571B9A-C341-4D8B-8AD1-C3171DC106EB}"/>
               </a:ext>
             </a:extLst>
           </p:cNvPr>
@@ -22613,34 +23124,124 @@
             <p:ph type="title"/>
           </p:nvPr>
         </p:nvSpPr>
-        <p:spPr>
-          <a:xfrm>
-            <a:off x="452514" y="330325"/>
-            <a:ext cx="11079822" cy="957600"/>
-          </a:xfrm>
-        </p:spPr>
+        <p:spPr/>
         <p:txBody>
           <a:bodyPr/>
           <a:lstStyle/>
           <a:p>
             <a:r>
+              <a:rPr lang="en-US" altLang="zh-CN" dirty="0">
+                <a:solidFill>
+                  <a:schemeClr val="tx1"/>
+                </a:solidFill>
+              </a:rPr>
+              <a:t>Visual Studio 2019 k8s </a:t>
+            </a:r>
+            <a:endParaRPr lang="zh-CN" altLang="en-US" dirty="0">
+              <a:solidFill>
+                <a:schemeClr val="tx1"/>
+              </a:solidFill>
+            </a:endParaRPr>
+          </a:p>
+        </p:txBody>
+      </p:sp>
+      <p:sp>
+        <p:nvSpPr>
+          <p:cNvPr id="3" name="内容占位符 2">
+            <a:extLst>
+              <a:ext uri="{FF2B5EF4-FFF2-40B4-BE49-F238E27FC236}">
+                <a16:creationId xmlns:a16="http://schemas.microsoft.com/office/drawing/2014/main" id="{49048738-C71B-413F-9CE4-58DCC2940F77}"/>
+              </a:ext>
+            </a:extLst>
+          </p:cNvPr>
+          <p:cNvSpPr>
+            <a:spLocks noGrp="1"/>
+          </p:cNvSpPr>
+          <p:nvPr>
+            <p:ph idx="1"/>
+          </p:nvPr>
+        </p:nvSpPr>
+        <p:spPr/>
+        <p:txBody>
+          <a:bodyPr/>
+          <a:lstStyle/>
+          <a:p>
+            <a:r>
               <a:rPr lang="en-US" altLang="zh-CN" dirty="0"/>
-              <a:t>Azure Container Registry –</a:t>
+              <a:t> Visual Studio </a:t>
             </a:r>
             <a:r>
               <a:rPr lang="zh-CN" altLang="en-US" dirty="0"/>
-              <a:t>发布</a:t>
-            </a:r>
-            <a:endParaRPr lang="en-GB" dirty="0"/>
+              <a:t>中的容器工具</a:t>
+            </a:r>
+            <a:r>
+              <a:rPr lang="en-US" altLang="zh-CN" dirty="0"/>
+              <a:t>:</a:t>
+            </a:r>
+            <a:endParaRPr lang="zh-CN" altLang="en-US" dirty="0"/>
+          </a:p>
+          <a:p>
+            <a:pPr marL="0" indent="0">
+              <a:buNone/>
+            </a:pPr>
+            <a:r>
+              <a:rPr lang="en-US" altLang="zh-CN" dirty="0">
+                <a:hlinkClick r:id="rId2"/>
+              </a:rPr>
+              <a:t>https://docs.microsoft.com/zh-cn/visualstudio/containers/?view=vs-2019</a:t>
+            </a:r>
+            <a:endParaRPr lang="en-US" altLang="zh-CN" dirty="0"/>
+          </a:p>
+          <a:p>
+            <a:pPr marL="0" indent="0">
+              <a:buNone/>
+            </a:pPr>
+            <a:endParaRPr lang="en-US" altLang="zh-CN" dirty="0"/>
+          </a:p>
+          <a:p>
+            <a:pPr marL="0" indent="0">
+              <a:buNone/>
+            </a:pPr>
+            <a:endParaRPr lang="zh-CN" altLang="en-US" dirty="0"/>
+          </a:p>
+        </p:txBody>
+      </p:sp>
+      <p:sp>
+        <p:nvSpPr>
+          <p:cNvPr id="4" name="灯片编号占位符 3">
+            <a:extLst>
+              <a:ext uri="{FF2B5EF4-FFF2-40B4-BE49-F238E27FC236}">
+                <a16:creationId xmlns:a16="http://schemas.microsoft.com/office/drawing/2014/main" id="{DA9C59B0-F48D-452F-B36C-841FED6D33B2}"/>
+              </a:ext>
+            </a:extLst>
+          </p:cNvPr>
+          <p:cNvSpPr>
+            <a:spLocks noGrp="1"/>
+          </p:cNvSpPr>
+          <p:nvPr>
+            <p:ph type="sldNum" sz="quarter" idx="12"/>
+          </p:nvPr>
+        </p:nvSpPr>
+        <p:spPr/>
+        <p:txBody>
+          <a:bodyPr/>
+          <a:lstStyle/>
+          <a:p>
+            <a:fld id="{0A164282-434E-41D4-9582-783D542A7B68}" type="slidenum">
+              <a:rPr lang="en-US" smtClean="0"/>
+              <a:pPr/>
+              <a:t>30</a:t>
+            </a:fld>
+            <a:endParaRPr lang="en-US"/>
           </a:p>
         </p:txBody>
       </p:sp>
       <p:pic>
         <p:nvPicPr>
-          <p:cNvPr id="6" name="Imagem 4">
+          <p:cNvPr id="5" name="图片 4">
             <a:extLst>
               <a:ext uri="{FF2B5EF4-FFF2-40B4-BE49-F238E27FC236}">
-                <a16:creationId xmlns:a16="http://schemas.microsoft.com/office/drawing/2014/main" id="{8BB5770B-4242-411E-8841-4BB7168780BA}"/>
+                <a16:creationId xmlns:a16="http://schemas.microsoft.com/office/drawing/2014/main" id="{85AF1B42-1217-4871-AE32-68253279D0DA}"/>
               </a:ext>
             </a:extLst>
           </p:cNvPr>
@@ -22657,365 +23258,24 @@
         </p:blipFill>
         <p:spPr>
           <a:xfrm>
-            <a:off x="4019281" y="4259780"/>
-            <a:ext cx="4725198" cy="2480729"/>
+            <a:off x="3332933" y="2856819"/>
+            <a:ext cx="3714750" cy="1343025"/>
           </a:xfrm>
           <a:prstGeom prst="rect">
             <a:avLst/>
           </a:prstGeom>
         </p:spPr>
       </p:pic>
-      <p:sp>
-        <p:nvSpPr>
-          <p:cNvPr id="7" name="Espaço Reservado para Texto 2">
-            <a:extLst>
-              <a:ext uri="{FF2B5EF4-FFF2-40B4-BE49-F238E27FC236}">
-                <a16:creationId xmlns:a16="http://schemas.microsoft.com/office/drawing/2014/main" id="{035E76A8-AED1-4B29-90CC-8D91BD19E66B}"/>
-              </a:ext>
-            </a:extLst>
-          </p:cNvPr>
-          <p:cNvSpPr txBox="1">
-            <a:spLocks/>
-          </p:cNvSpPr>
-          <p:nvPr/>
-        </p:nvSpPr>
-        <p:spPr>
-          <a:xfrm>
-            <a:off x="544125" y="1803651"/>
-            <a:ext cx="10896599" cy="2359877"/>
-          </a:xfrm>
-          <a:prstGeom prst="rect">
-            <a:avLst/>
-          </a:prstGeom>
-          <a:solidFill>
-            <a:schemeClr val="bg2">
-              <a:lumMod val="95000"/>
-            </a:schemeClr>
-          </a:solidFill>
-        </p:spPr>
-        <p:txBody>
-          <a:bodyPr/>
-          <a:lstStyle>
-            <a:lvl1pPr marL="228600" indent="-228600" algn="l" defTabSz="914400" rtl="0" eaLnBrk="1" latinLnBrk="0" hangingPunct="1">
-              <a:lnSpc>
-                <a:spcPct val="90000"/>
-              </a:lnSpc>
-              <a:spcBef>
-                <a:spcPts val="1000"/>
-              </a:spcBef>
-              <a:buFont typeface="Arial" panose="020B0604020202020204" pitchFamily="34" charset="0"/>
-              <a:buChar char="•"/>
-              <a:defRPr sz="3600" b="0" kern="1200" baseline="0">
-                <a:solidFill>
-                  <a:schemeClr val="bg1"/>
-                </a:solidFill>
-                <a:latin typeface="Microsoft YaHei" panose="020B0503020204020204" pitchFamily="34" charset="-122"/>
-                <a:ea typeface="+mn-ea"/>
-                <a:cs typeface="+mn-cs"/>
-              </a:defRPr>
-            </a:lvl1pPr>
-            <a:lvl2pPr marL="685800" indent="-228600" algn="l" defTabSz="914400" rtl="0" eaLnBrk="1" latinLnBrk="0" hangingPunct="1">
-              <a:lnSpc>
-                <a:spcPct val="90000"/>
-              </a:lnSpc>
-              <a:spcBef>
-                <a:spcPts val="500"/>
-              </a:spcBef>
-              <a:buFont typeface="Arial" panose="020B0604020202020204" pitchFamily="34" charset="0"/>
-              <a:buChar char="•"/>
-              <a:defRPr sz="3200" kern="1200" baseline="0">
-                <a:solidFill>
-                  <a:schemeClr val="bg1"/>
-                </a:solidFill>
-                <a:latin typeface="Microsoft YaHei" panose="020B0503020204020204" pitchFamily="34" charset="-122"/>
-                <a:ea typeface="+mn-ea"/>
-                <a:cs typeface="+mn-cs"/>
-              </a:defRPr>
-            </a:lvl2pPr>
-            <a:lvl3pPr marL="1143000" indent="-228600" algn="l" defTabSz="914400" rtl="0" eaLnBrk="1" latinLnBrk="0" hangingPunct="1">
-              <a:lnSpc>
-                <a:spcPct val="90000"/>
-              </a:lnSpc>
-              <a:spcBef>
-                <a:spcPts val="500"/>
-              </a:spcBef>
-              <a:buFont typeface="Arial" panose="020B0604020202020204" pitchFamily="34" charset="0"/>
-              <a:buChar char="•"/>
-              <a:defRPr sz="2800" kern="1200" baseline="0">
-                <a:solidFill>
-                  <a:schemeClr val="bg1"/>
-                </a:solidFill>
-                <a:latin typeface="Microsoft YaHei" panose="020B0503020204020204" pitchFamily="34" charset="-122"/>
-                <a:ea typeface="+mn-ea"/>
-                <a:cs typeface="+mn-cs"/>
-              </a:defRPr>
-            </a:lvl3pPr>
-            <a:lvl4pPr marL="1600200" indent="-228600" algn="l" defTabSz="914400" rtl="0" eaLnBrk="1" latinLnBrk="0" hangingPunct="1">
-              <a:lnSpc>
-                <a:spcPct val="90000"/>
-              </a:lnSpc>
-              <a:spcBef>
-                <a:spcPts val="500"/>
-              </a:spcBef>
-              <a:buFont typeface="Arial" panose="020B0604020202020204" pitchFamily="34" charset="0"/>
-              <a:buChar char="•"/>
-              <a:defRPr sz="2400" kern="1200" baseline="0">
-                <a:solidFill>
-                  <a:schemeClr val="bg1"/>
-                </a:solidFill>
-                <a:latin typeface="Microsoft YaHei" panose="020B0503020204020204" pitchFamily="34" charset="-122"/>
-                <a:ea typeface="+mn-ea"/>
-                <a:cs typeface="+mn-cs"/>
-              </a:defRPr>
-            </a:lvl4pPr>
-            <a:lvl5pPr marL="2057400" indent="-228600" algn="l" defTabSz="914400" rtl="0" eaLnBrk="1" latinLnBrk="0" hangingPunct="1">
-              <a:lnSpc>
-                <a:spcPct val="90000"/>
-              </a:lnSpc>
-              <a:spcBef>
-                <a:spcPts val="500"/>
-              </a:spcBef>
-              <a:buFont typeface="Arial" panose="020B0604020202020204" pitchFamily="34" charset="0"/>
-              <a:buChar char="•"/>
-              <a:defRPr sz="2400" kern="1200" baseline="0">
-                <a:solidFill>
-                  <a:schemeClr val="bg1"/>
-                </a:solidFill>
-                <a:latin typeface="Microsoft YaHei" panose="020B0503020204020204" pitchFamily="34" charset="-122"/>
-                <a:ea typeface="+mn-ea"/>
-                <a:cs typeface="+mn-cs"/>
-              </a:defRPr>
-            </a:lvl5pPr>
-            <a:lvl6pPr marL="2514600" indent="-228600" algn="l" defTabSz="914400" rtl="0" eaLnBrk="1" latinLnBrk="0" hangingPunct="1">
-              <a:lnSpc>
-                <a:spcPct val="90000"/>
-              </a:lnSpc>
-              <a:spcBef>
-                <a:spcPts val="500"/>
-              </a:spcBef>
-              <a:buFont typeface="Arial" panose="020B0604020202020204" pitchFamily="34" charset="0"/>
-              <a:buChar char="•"/>
-              <a:defRPr sz="1800" kern="1200">
-                <a:solidFill>
-                  <a:schemeClr val="tx1"/>
-                </a:solidFill>
-                <a:latin typeface="+mn-lt"/>
-                <a:ea typeface="+mn-ea"/>
-                <a:cs typeface="+mn-cs"/>
-              </a:defRPr>
-            </a:lvl6pPr>
-            <a:lvl7pPr marL="2971800" indent="-228600" algn="l" defTabSz="914400" rtl="0" eaLnBrk="1" latinLnBrk="0" hangingPunct="1">
-              <a:lnSpc>
-                <a:spcPct val="90000"/>
-              </a:lnSpc>
-              <a:spcBef>
-                <a:spcPts val="500"/>
-              </a:spcBef>
-              <a:buFont typeface="Arial" panose="020B0604020202020204" pitchFamily="34" charset="0"/>
-              <a:buChar char="•"/>
-              <a:defRPr sz="1800" kern="1200">
-                <a:solidFill>
-                  <a:schemeClr val="tx1"/>
-                </a:solidFill>
-                <a:latin typeface="+mn-lt"/>
-                <a:ea typeface="+mn-ea"/>
-                <a:cs typeface="+mn-cs"/>
-              </a:defRPr>
-            </a:lvl7pPr>
-            <a:lvl8pPr marL="3429000" indent="-228600" algn="l" defTabSz="914400" rtl="0" eaLnBrk="1" latinLnBrk="0" hangingPunct="1">
-              <a:lnSpc>
-                <a:spcPct val="90000"/>
-              </a:lnSpc>
-              <a:spcBef>
-                <a:spcPts val="500"/>
-              </a:spcBef>
-              <a:buFont typeface="Arial" panose="020B0604020202020204" pitchFamily="34" charset="0"/>
-              <a:buChar char="•"/>
-              <a:defRPr sz="1800" kern="1200">
-                <a:solidFill>
-                  <a:schemeClr val="tx1"/>
-                </a:solidFill>
-                <a:latin typeface="+mn-lt"/>
-                <a:ea typeface="+mn-ea"/>
-                <a:cs typeface="+mn-cs"/>
-              </a:defRPr>
-            </a:lvl8pPr>
-            <a:lvl9pPr marL="3886200" indent="-228600" algn="l" defTabSz="914400" rtl="0" eaLnBrk="1" latinLnBrk="0" hangingPunct="1">
-              <a:lnSpc>
-                <a:spcPct val="90000"/>
-              </a:lnSpc>
-              <a:spcBef>
-                <a:spcPts val="500"/>
-              </a:spcBef>
-              <a:buFont typeface="Arial" panose="020B0604020202020204" pitchFamily="34" charset="0"/>
-              <a:buChar char="•"/>
-              <a:defRPr sz="1800" kern="1200">
-                <a:solidFill>
-                  <a:schemeClr val="tx1"/>
-                </a:solidFill>
-                <a:latin typeface="+mn-lt"/>
-                <a:ea typeface="+mn-ea"/>
-                <a:cs typeface="+mn-cs"/>
-              </a:defRPr>
-            </a:lvl9pPr>
-          </a:lstStyle>
-          <a:p>
-            <a:r>
-              <a:rPr lang="pt-BR" sz="2200" b="1" dirty="0">
-                <a:solidFill>
-                  <a:srgbClr val="494949"/>
-                </a:solidFill>
-                <a:latin typeface="Courier New" panose="02070309020205020404" pitchFamily="49" charset="0"/>
-                <a:cs typeface="Courier New" panose="02070309020205020404" pitchFamily="49" charset="0"/>
-              </a:rPr>
-              <a:t>docker tag </a:t>
-            </a:r>
-            <a:r>
-              <a:rPr lang="pt-BR" sz="2200" dirty="0">
-                <a:solidFill>
-                  <a:srgbClr val="494949"/>
-                </a:solidFill>
-                <a:latin typeface="Courier New" panose="02070309020205020404" pitchFamily="49" charset="0"/>
-                <a:cs typeface="Courier New" panose="02070309020205020404" pitchFamily="49" charset="0"/>
-              </a:rPr>
-              <a:t>apicontagem:latest groffecr.azurecr.io/apicontagem</a:t>
-            </a:r>
-          </a:p>
-          <a:p>
-            <a:endParaRPr lang="pt-BR" sz="2200" dirty="0">
-              <a:solidFill>
-                <a:srgbClr val="494949"/>
-              </a:solidFill>
-              <a:latin typeface="Courier New" panose="02070309020205020404" pitchFamily="49" charset="0"/>
-              <a:cs typeface="Courier New" panose="02070309020205020404" pitchFamily="49" charset="0"/>
-            </a:endParaRPr>
-          </a:p>
-          <a:p>
-            <a:r>
-              <a:rPr lang="pt-BR" sz="2200" b="1" dirty="0">
-                <a:solidFill>
-                  <a:srgbClr val="494949"/>
-                </a:solidFill>
-                <a:latin typeface="Courier New" panose="02070309020205020404" pitchFamily="49" charset="0"/>
-                <a:cs typeface="Courier New" panose="02070309020205020404" pitchFamily="49" charset="0"/>
-              </a:rPr>
-              <a:t>docker login </a:t>
-            </a:r>
-            <a:r>
-              <a:rPr lang="pt-BR" sz="2200" dirty="0">
-                <a:solidFill>
-                  <a:srgbClr val="494949"/>
-                </a:solidFill>
-                <a:latin typeface="Courier New" panose="02070309020205020404" pitchFamily="49" charset="0"/>
-                <a:cs typeface="Courier New" panose="02070309020205020404" pitchFamily="49" charset="0"/>
-              </a:rPr>
-              <a:t>groffecr.azurecr.io </a:t>
-            </a:r>
-            <a:r>
-              <a:rPr lang="pt-BR" sz="2200" b="1" dirty="0">
-                <a:solidFill>
-                  <a:srgbClr val="494949"/>
-                </a:solidFill>
-                <a:latin typeface="Courier New" panose="02070309020205020404" pitchFamily="49" charset="0"/>
-                <a:cs typeface="Courier New" panose="02070309020205020404" pitchFamily="49" charset="0"/>
-              </a:rPr>
-              <a:t>-u </a:t>
-            </a:r>
-            <a:r>
-              <a:rPr lang="pt-BR" sz="2200" dirty="0">
-                <a:solidFill>
-                  <a:srgbClr val="494949"/>
-                </a:solidFill>
-                <a:latin typeface="Courier New" panose="02070309020205020404" pitchFamily="49" charset="0"/>
-                <a:cs typeface="Courier New" panose="02070309020205020404" pitchFamily="49" charset="0"/>
-              </a:rPr>
-              <a:t>USUÁRIO </a:t>
-            </a:r>
-            <a:r>
-              <a:rPr lang="pt-BR" sz="2200" b="1" dirty="0">
-                <a:solidFill>
-                  <a:srgbClr val="494949"/>
-                </a:solidFill>
-                <a:latin typeface="Courier New" panose="02070309020205020404" pitchFamily="49" charset="0"/>
-                <a:cs typeface="Courier New" panose="02070309020205020404" pitchFamily="49" charset="0"/>
-              </a:rPr>
-              <a:t>-p </a:t>
-            </a:r>
-            <a:r>
-              <a:rPr lang="pt-BR" sz="2200" dirty="0">
-                <a:solidFill>
-                  <a:srgbClr val="494949"/>
-                </a:solidFill>
-                <a:latin typeface="Courier New" panose="02070309020205020404" pitchFamily="49" charset="0"/>
-                <a:cs typeface="Courier New" panose="02070309020205020404" pitchFamily="49" charset="0"/>
-              </a:rPr>
-              <a:t>SENHA</a:t>
-            </a:r>
-          </a:p>
-          <a:p>
-            <a:endParaRPr lang="pt-BR" sz="2200" dirty="0">
-              <a:solidFill>
-                <a:srgbClr val="494949"/>
-              </a:solidFill>
-              <a:latin typeface="Courier New" panose="02070309020205020404" pitchFamily="49" charset="0"/>
-              <a:cs typeface="Courier New" panose="02070309020205020404" pitchFamily="49" charset="0"/>
-            </a:endParaRPr>
-          </a:p>
-          <a:p>
-            <a:r>
-              <a:rPr lang="pt-BR" sz="2200" b="1" dirty="0">
-                <a:solidFill>
-                  <a:srgbClr val="494949"/>
-                </a:solidFill>
-                <a:latin typeface="Courier New" panose="02070309020205020404" pitchFamily="49" charset="0"/>
-                <a:cs typeface="Courier New" panose="02070309020205020404" pitchFamily="49" charset="0"/>
-              </a:rPr>
-              <a:t>docker push</a:t>
-            </a:r>
-            <a:r>
-              <a:rPr lang="pt-BR" sz="2200" dirty="0">
-                <a:solidFill>
-                  <a:srgbClr val="494949"/>
-                </a:solidFill>
-                <a:latin typeface="Courier New" panose="02070309020205020404" pitchFamily="49" charset="0"/>
-                <a:cs typeface="Courier New" panose="02070309020205020404" pitchFamily="49" charset="0"/>
-              </a:rPr>
-              <a:t> groffecr.azurecr.io/apicontagem</a:t>
-            </a:r>
-          </a:p>
-          <a:p>
-            <a:endParaRPr lang="pt-BR" sz="2200" dirty="0">
-              <a:solidFill>
-                <a:srgbClr val="494949"/>
-              </a:solidFill>
-              <a:latin typeface="Courier New" panose="02070309020205020404" pitchFamily="49" charset="0"/>
-              <a:cs typeface="Courier New" panose="02070309020205020404" pitchFamily="49" charset="0"/>
-            </a:endParaRPr>
-          </a:p>
-        </p:txBody>
-      </p:sp>
     </p:spTree>
     <p:extLst>
       <p:ext uri="{BB962C8B-B14F-4D97-AF65-F5344CB8AC3E}">
-        <p14:creationId xmlns:p14="http://schemas.microsoft.com/office/powerpoint/2010/main" val="2539974529"/>
+        <p14:creationId xmlns:p14="http://schemas.microsoft.com/office/powerpoint/2010/main" val="1952295127"/>
       </p:ext>
     </p:extLst>
   </p:cSld>
   <p:clrMapOvr>
     <a:masterClrMapping/>
   </p:clrMapOvr>
-  <mc:AlternateContent xmlns:mc="http://schemas.openxmlformats.org/markup-compatibility/2006" xmlns:p14="http://schemas.microsoft.com/office/powerpoint/2010/main">
-    <mc:Choice Requires="p14">
-      <p:transition spd="med" p14:dur="700">
-        <p:fade/>
-      </p:transition>
-    </mc:Choice>
-    <mc:Fallback xmlns="">
-      <p:transition spd="med">
-        <p:fade/>
-      </p:transition>
-    </mc:Fallback>
-  </mc:AlternateContent>
 </p:sld>
 </file>
 
@@ -23063,12 +23323,12 @@
           <a:lstStyle/>
           <a:p>
             <a:r>
-              <a:rPr lang="en-US" altLang="zh-CN" dirty="0">
+              <a:rPr lang="en-US" altLang="zh-CN" dirty="0" err="1">
                 <a:solidFill>
                   <a:schemeClr val="tx1"/>
                 </a:solidFill>
               </a:rPr>
-              <a:t>Azure Container Registry</a:t>
+              <a:t>TencentHub</a:t>
             </a:r>
             <a:endParaRPr lang="en-GB" dirty="0">
               <a:solidFill>
@@ -23078,6 +23338,100 @@
           </a:p>
         </p:txBody>
       </p:sp>
+      <p:sp>
+        <p:nvSpPr>
+          <p:cNvPr id="3" name="矩形 2">
+            <a:extLst>
+              <a:ext uri="{FF2B5EF4-FFF2-40B4-BE49-F238E27FC236}">
+                <a16:creationId xmlns:a16="http://schemas.microsoft.com/office/drawing/2014/main" id="{D5065B45-5AF8-4BAE-80C0-3102AA649172}"/>
+              </a:ext>
+            </a:extLst>
+          </p:cNvPr>
+          <p:cNvSpPr/>
+          <p:nvPr/>
+        </p:nvSpPr>
+        <p:spPr>
+          <a:xfrm>
+            <a:off x="920465" y="1859461"/>
+            <a:ext cx="10600023" cy="584775"/>
+          </a:xfrm>
+          <a:prstGeom prst="rect">
+            <a:avLst/>
+          </a:prstGeom>
+        </p:spPr>
+        <p:txBody>
+          <a:bodyPr wrap="square">
+            <a:spAutoFit/>
+          </a:bodyPr>
+          <a:lstStyle/>
+          <a:p>
+            <a:pPr marL="571500" indent="-571500">
+              <a:buFont typeface="Arial" panose="020B0604020202020204" pitchFamily="34" charset="0"/>
+              <a:buChar char="•"/>
+            </a:pPr>
+            <a:r>
+              <a:rPr lang="zh-CN" altLang="en-US" sz="3200" dirty="0">
+                <a:solidFill>
+                  <a:schemeClr val="accent1"/>
+                </a:solidFill>
+              </a:rPr>
+              <a:t>多功能存储仓库</a:t>
+            </a:r>
+            <a:endParaRPr lang="en-US" altLang="zh-CN" sz="3200" b="1" dirty="0">
+              <a:solidFill>
+                <a:schemeClr val="accent1"/>
+              </a:solidFill>
+            </a:endParaRPr>
+          </a:p>
+        </p:txBody>
+      </p:sp>
+      <p:pic>
+        <p:nvPicPr>
+          <p:cNvPr id="4098" name="Picture 2" descr="https://img2018.cnblogs.com/blog/70544/201901/70544-20190109141328996-522349762.png">
+            <a:extLst>
+              <a:ext uri="{FF2B5EF4-FFF2-40B4-BE49-F238E27FC236}">
+                <a16:creationId xmlns:a16="http://schemas.microsoft.com/office/drawing/2014/main" id="{656455A1-096A-479A-A7BD-4DB20A40009C}"/>
+              </a:ext>
+            </a:extLst>
+          </p:cNvPr>
+          <p:cNvPicPr>
+            <a:picLocks noChangeAspect="1" noChangeArrowheads="1"/>
+          </p:cNvPicPr>
+          <p:nvPr/>
+        </p:nvPicPr>
+        <p:blipFill>
+          <a:blip r:embed="rId3">
+            <a:extLst>
+              <a:ext uri="{28A0092B-C50C-407E-A947-70E740481C1C}">
+                <a14:useLocalDpi xmlns:a14="http://schemas.microsoft.com/office/drawing/2010/main" val="0"/>
+              </a:ext>
+            </a:extLst>
+          </a:blip>
+          <a:srcRect/>
+          <a:stretch>
+            <a:fillRect/>
+          </a:stretch>
+        </p:blipFill>
+        <p:spPr bwMode="auto">
+          <a:xfrm>
+            <a:off x="2305050" y="1538288"/>
+            <a:ext cx="8267700" cy="4810125"/>
+          </a:xfrm>
+          <a:prstGeom prst="rect">
+            <a:avLst/>
+          </a:prstGeom>
+          <a:noFill/>
+          <a:extLst>
+            <a:ext uri="{909E8E84-426E-40DD-AFC4-6F175D3DCCD1}">
+              <a14:hiddenFill xmlns:a14="http://schemas.microsoft.com/office/drawing/2010/main">
+                <a:solidFill>
+                  <a:srgbClr val="FFFFFF"/>
+                </a:solidFill>
+              </a14:hiddenFill>
+            </a:ext>
+          </a:extLst>
+        </p:spPr>
+      </p:pic>
     </p:spTree>
     <p:extLst>
       <p:ext uri="{BB962C8B-B14F-4D97-AF65-F5344CB8AC3E}">
@@ -23151,7 +23505,7 @@
           <a:graphicData uri="http://schemas.openxmlformats.org/presentationml/2006/ole">
             <mc:AlternateContent xmlns:mc="http://schemas.openxmlformats.org/markup-compatibility/2006">
               <mc:Choice xmlns:v="urn:schemas-microsoft-com:vml" Requires="v">
-                <p:oleObj spid="_x0000_s2121" name="think-cell Slide" r:id="rId6" imgW="347" imgH="348" progId="TCLayout.ActiveDocument.1">
+                <p:oleObj spid="_x0000_s2125" name="think-cell Slide" r:id="rId6" imgW="347" imgH="348" progId="TCLayout.ActiveDocument.1">
                   <p:embed/>
                 </p:oleObj>
               </mc:Choice>

</xml_diff>